<commit_message>
end of json project and content providers
</commit_message>
<xml_diff>
--- a/Presentaciones/Curso de Android (II) - Interfaz de Usuario.pptx
+++ b/Presentaciones/Curso de Android (II) - Interfaz de Usuario.pptx
@@ -223,7 +223,7 @@
           <a:p>
             <a:fld id="{6BC4CF82-DD4D-4784-B08C-58DDF67CB13D}" type="datetimeFigureOut">
               <a:rPr lang="es-GT" smtClean="0"/>
-              <a:t>14/02/2015</a:t>
+              <a:t>15/05/2015</a:t>
             </a:fld>
             <a:endParaRPr lang="es-GT"/>
           </a:p>
@@ -1415,7 +1415,7 @@
           <a:p>
             <a:fld id="{4BEA1FFC-0729-4B4E-874A-BB33F34F7B19}" type="datetimeFigureOut">
               <a:rPr lang="bs-Latn-BA" smtClean="0"/>
-              <a:t>14.2.2015</a:t>
+              <a:t>15.5.2015</a:t>
             </a:fld>
             <a:endParaRPr lang="bs-Latn-BA"/>
           </a:p>
@@ -1592,7 +1592,7 @@
           <a:p>
             <a:fld id="{4BEA1FFC-0729-4B4E-874A-BB33F34F7B19}" type="datetimeFigureOut">
               <a:rPr lang="bs-Latn-BA" smtClean="0"/>
-              <a:t>14.2.2015</a:t>
+              <a:t>15.5.2015</a:t>
             </a:fld>
             <a:endParaRPr lang="bs-Latn-BA"/>
           </a:p>
@@ -1772,7 +1772,7 @@
           <a:p>
             <a:fld id="{4BEA1FFC-0729-4B4E-874A-BB33F34F7B19}" type="datetimeFigureOut">
               <a:rPr lang="bs-Latn-BA" smtClean="0"/>
-              <a:t>14.2.2015</a:t>
+              <a:t>15.5.2015</a:t>
             </a:fld>
             <a:endParaRPr lang="bs-Latn-BA"/>
           </a:p>
@@ -2019,7 +2019,7 @@
             <a:fld id="{4BEA1FFC-0729-4B4E-874A-BB33F34F7B19}" type="datetimeFigureOut">
               <a:rPr lang="bs-Latn-BA" smtClean="0"/>
               <a:pPr/>
-              <a:t>14.2.2015</a:t>
+              <a:t>15.5.2015</a:t>
             </a:fld>
             <a:endParaRPr lang="bs-Latn-BA"/>
           </a:p>
@@ -2301,7 +2301,7 @@
           <a:p>
             <a:fld id="{4BEA1FFC-0729-4B4E-874A-BB33F34F7B19}" type="datetimeFigureOut">
               <a:rPr lang="bs-Latn-BA" smtClean="0"/>
-              <a:t>14.2.2015</a:t>
+              <a:t>15.5.2015</a:t>
             </a:fld>
             <a:endParaRPr lang="bs-Latn-BA"/>
           </a:p>
@@ -2596,7 +2596,7 @@
           <a:p>
             <a:fld id="{4BEA1FFC-0729-4B4E-874A-BB33F34F7B19}" type="datetimeFigureOut">
               <a:rPr lang="bs-Latn-BA" smtClean="0"/>
-              <a:t>14.2.2015</a:t>
+              <a:t>15.5.2015</a:t>
             </a:fld>
             <a:endParaRPr lang="bs-Latn-BA"/>
           </a:p>
@@ -3018,7 +3018,7 @@
           <a:p>
             <a:fld id="{4BEA1FFC-0729-4B4E-874A-BB33F34F7B19}" type="datetimeFigureOut">
               <a:rPr lang="bs-Latn-BA" smtClean="0"/>
-              <a:t>14.2.2015</a:t>
+              <a:t>15.5.2015</a:t>
             </a:fld>
             <a:endParaRPr lang="bs-Latn-BA"/>
           </a:p>
@@ -3136,7 +3136,7 @@
           <a:p>
             <a:fld id="{4BEA1FFC-0729-4B4E-874A-BB33F34F7B19}" type="datetimeFigureOut">
               <a:rPr lang="bs-Latn-BA" smtClean="0"/>
-              <a:t>14.2.2015</a:t>
+              <a:t>15.5.2015</a:t>
             </a:fld>
             <a:endParaRPr lang="bs-Latn-BA"/>
           </a:p>
@@ -3231,7 +3231,7 @@
           <a:p>
             <a:fld id="{4BEA1FFC-0729-4B4E-874A-BB33F34F7B19}" type="datetimeFigureOut">
               <a:rPr lang="bs-Latn-BA" smtClean="0"/>
-              <a:t>14.2.2015</a:t>
+              <a:t>15.5.2015</a:t>
             </a:fld>
             <a:endParaRPr lang="bs-Latn-BA"/>
           </a:p>
@@ -3508,7 +3508,7 @@
           <a:p>
             <a:fld id="{4BEA1FFC-0729-4B4E-874A-BB33F34F7B19}" type="datetimeFigureOut">
               <a:rPr lang="bs-Latn-BA" smtClean="0"/>
-              <a:t>14.2.2015</a:t>
+              <a:t>15.5.2015</a:t>
             </a:fld>
             <a:endParaRPr lang="bs-Latn-BA"/>
           </a:p>
@@ -3765,7 +3765,7 @@
           <a:p>
             <a:fld id="{4BEA1FFC-0729-4B4E-874A-BB33F34F7B19}" type="datetimeFigureOut">
               <a:rPr lang="bs-Latn-BA" smtClean="0"/>
-              <a:t>14.2.2015</a:t>
+              <a:t>15.5.2015</a:t>
             </a:fld>
             <a:endParaRPr lang="bs-Latn-BA"/>
           </a:p>
@@ -3986,7 +3986,7 @@
             <a:fld id="{4BEA1FFC-0729-4B4E-874A-BB33F34F7B19}" type="datetimeFigureOut">
               <a:rPr lang="bs-Latn-BA" smtClean="0"/>
               <a:pPr/>
-              <a:t>14.2.2015</a:t>
+              <a:t>15.5.2015</a:t>
             </a:fld>
             <a:endParaRPr lang="bs-Latn-BA"/>
           </a:p>

</xml_diff>